<commit_message>
feat: big list of all assets
</commit_message>
<xml_diff>
--- a/distrib.pptx
+++ b/distrib.pptx
@@ -9,13 +9,17 @@
     <p:sldId id="257" r:id="rId3"/>
     <p:sldId id="258" r:id="rId4"/>
     <p:sldId id="259" r:id="rId5"/>
-    <p:sldId id="260" r:id="rId6"/>
-    <p:sldId id="261" r:id="rId7"/>
-    <p:sldId id="262" r:id="rId8"/>
-    <p:sldId id="263" r:id="rId9"/>
-    <p:sldId id="264" r:id="rId10"/>
-    <p:sldId id="266" r:id="rId11"/>
-    <p:sldId id="265" r:id="rId12"/>
+    <p:sldId id="267" r:id="rId6"/>
+    <p:sldId id="268" r:id="rId7"/>
+    <p:sldId id="269" r:id="rId8"/>
+    <p:sldId id="270" r:id="rId9"/>
+    <p:sldId id="260" r:id="rId10"/>
+    <p:sldId id="261" r:id="rId11"/>
+    <p:sldId id="262" r:id="rId12"/>
+    <p:sldId id="263" r:id="rId13"/>
+    <p:sldId id="264" r:id="rId14"/>
+    <p:sldId id="266" r:id="rId15"/>
+    <p:sldId id="265" r:id="rId16"/>
   </p:sldIdLst>
   <p:sldSz cx="12192000" cy="6858000"/>
   <p:notesSz cx="6858000" cy="9144000"/>
@@ -271,7 +275,7 @@
           <a:p>
             <a:fld id="{052B9397-B334-4C55-84CE-AE7D25EB516D}" type="datetimeFigureOut">
               <a:rPr lang="ru-KZ" smtClean="0"/>
-              <a:t>28.10.2022</a:t>
+              <a:t>08.11.2022</a:t>
             </a:fld>
             <a:endParaRPr lang="ru-KZ"/>
           </a:p>
@@ -471,7 +475,7 @@
           <a:p>
             <a:fld id="{052B9397-B334-4C55-84CE-AE7D25EB516D}" type="datetimeFigureOut">
               <a:rPr lang="ru-KZ" smtClean="0"/>
-              <a:t>28.10.2022</a:t>
+              <a:t>08.11.2022</a:t>
             </a:fld>
             <a:endParaRPr lang="ru-KZ"/>
           </a:p>
@@ -681,7 +685,7 @@
           <a:p>
             <a:fld id="{052B9397-B334-4C55-84CE-AE7D25EB516D}" type="datetimeFigureOut">
               <a:rPr lang="ru-KZ" smtClean="0"/>
-              <a:t>28.10.2022</a:t>
+              <a:t>08.11.2022</a:t>
             </a:fld>
             <a:endParaRPr lang="ru-KZ"/>
           </a:p>
@@ -881,7 +885,7 @@
           <a:p>
             <a:fld id="{052B9397-B334-4C55-84CE-AE7D25EB516D}" type="datetimeFigureOut">
               <a:rPr lang="ru-KZ" smtClean="0"/>
-              <a:t>28.10.2022</a:t>
+              <a:t>08.11.2022</a:t>
             </a:fld>
             <a:endParaRPr lang="ru-KZ"/>
           </a:p>
@@ -1157,7 +1161,7 @@
           <a:p>
             <a:fld id="{052B9397-B334-4C55-84CE-AE7D25EB516D}" type="datetimeFigureOut">
               <a:rPr lang="ru-KZ" smtClean="0"/>
-              <a:t>28.10.2022</a:t>
+              <a:t>08.11.2022</a:t>
             </a:fld>
             <a:endParaRPr lang="ru-KZ"/>
           </a:p>
@@ -1425,7 +1429,7 @@
           <a:p>
             <a:fld id="{052B9397-B334-4C55-84CE-AE7D25EB516D}" type="datetimeFigureOut">
               <a:rPr lang="ru-KZ" smtClean="0"/>
-              <a:t>28.10.2022</a:t>
+              <a:t>08.11.2022</a:t>
             </a:fld>
             <a:endParaRPr lang="ru-KZ"/>
           </a:p>
@@ -1840,7 +1844,7 @@
           <a:p>
             <a:fld id="{052B9397-B334-4C55-84CE-AE7D25EB516D}" type="datetimeFigureOut">
               <a:rPr lang="ru-KZ" smtClean="0"/>
-              <a:t>28.10.2022</a:t>
+              <a:t>08.11.2022</a:t>
             </a:fld>
             <a:endParaRPr lang="ru-KZ"/>
           </a:p>
@@ -1982,7 +1986,7 @@
           <a:p>
             <a:fld id="{052B9397-B334-4C55-84CE-AE7D25EB516D}" type="datetimeFigureOut">
               <a:rPr lang="ru-KZ" smtClean="0"/>
-              <a:t>28.10.2022</a:t>
+              <a:t>08.11.2022</a:t>
             </a:fld>
             <a:endParaRPr lang="ru-KZ"/>
           </a:p>
@@ -2095,7 +2099,7 @@
           <a:p>
             <a:fld id="{052B9397-B334-4C55-84CE-AE7D25EB516D}" type="datetimeFigureOut">
               <a:rPr lang="ru-KZ" smtClean="0"/>
-              <a:t>28.10.2022</a:t>
+              <a:t>08.11.2022</a:t>
             </a:fld>
             <a:endParaRPr lang="ru-KZ"/>
           </a:p>
@@ -2408,7 +2412,7 @@
           <a:p>
             <a:fld id="{052B9397-B334-4C55-84CE-AE7D25EB516D}" type="datetimeFigureOut">
               <a:rPr lang="ru-KZ" smtClean="0"/>
-              <a:t>28.10.2022</a:t>
+              <a:t>08.11.2022</a:t>
             </a:fld>
             <a:endParaRPr lang="ru-KZ"/>
           </a:p>
@@ -2697,7 +2701,7 @@
           <a:p>
             <a:fld id="{052B9397-B334-4C55-84CE-AE7D25EB516D}" type="datetimeFigureOut">
               <a:rPr lang="ru-KZ" smtClean="0"/>
-              <a:t>28.10.2022</a:t>
+              <a:t>08.11.2022</a:t>
             </a:fld>
             <a:endParaRPr lang="ru-KZ"/>
           </a:p>
@@ -2940,7 +2944,7 @@
           <a:p>
             <a:fld id="{052B9397-B334-4C55-84CE-AE7D25EB516D}" type="datetimeFigureOut">
               <a:rPr lang="ru-KZ" smtClean="0"/>
-              <a:t>28.10.2022</a:t>
+              <a:t>08.11.2022</a:t>
             </a:fld>
             <a:endParaRPr lang="ru-KZ"/>
           </a:p>
@@ -3517,6 +3521,610 @@
           <p:cNvPr id="2" name="Title 1">
             <a:extLst>
               <a:ext uri="{FF2B5EF4-FFF2-40B4-BE49-F238E27FC236}">
+                <a16:creationId xmlns:a16="http://schemas.microsoft.com/office/drawing/2014/main" id="{9A4273E8-CF08-4F37-B1CC-AF52FE1208AF}"/>
+              </a:ext>
+            </a:extLst>
+          </p:cNvPr>
+          <p:cNvSpPr>
+            <a:spLocks noGrp="1"/>
+          </p:cNvSpPr>
+          <p:nvPr>
+            <p:ph type="title"/>
+          </p:nvPr>
+        </p:nvSpPr>
+        <p:spPr/>
+        <p:txBody>
+          <a:bodyPr/>
+          <a:lstStyle/>
+          <a:p>
+            <a:r>
+              <a:rPr lang="en-US" dirty="0"/>
+              <a:t>Formulization for supervised learning</a:t>
+            </a:r>
+            <a:endParaRPr lang="ru-KZ" dirty="0"/>
+          </a:p>
+        </p:txBody>
+      </p:sp>
+      <p:sp>
+        <p:nvSpPr>
+          <p:cNvPr id="3" name="Content Placeholder 2">
+            <a:extLst>
+              <a:ext uri="{FF2B5EF4-FFF2-40B4-BE49-F238E27FC236}">
+                <a16:creationId xmlns:a16="http://schemas.microsoft.com/office/drawing/2014/main" id="{70C5A7DC-AE20-487B-9D71-F6D9365C42F1}"/>
+              </a:ext>
+            </a:extLst>
+          </p:cNvPr>
+          <p:cNvSpPr>
+            <a:spLocks noGrp="1"/>
+          </p:cNvSpPr>
+          <p:nvPr>
+            <p:ph idx="1"/>
+          </p:nvPr>
+        </p:nvSpPr>
+        <p:spPr/>
+        <p:txBody>
+          <a:bodyPr/>
+          <a:lstStyle/>
+          <a:p>
+            <a:r>
+              <a:rPr lang="en-US" dirty="0"/>
+              <a:t>Given</a:t>
+            </a:r>
+          </a:p>
+          <a:p>
+            <a:r>
+              <a:rPr lang="en-US" dirty="0"/>
+              <a:t>Predictions</a:t>
+            </a:r>
+          </a:p>
+          <a:p>
+            <a:r>
+              <a:rPr lang="en-US" dirty="0"/>
+              <a:t>Algorithm to create upper bound</a:t>
+            </a:r>
+          </a:p>
+          <a:p>
+            <a:r>
+              <a:rPr lang="en-US" dirty="0"/>
+              <a:t>Algorithm is iterative</a:t>
+            </a:r>
+          </a:p>
+          <a:p>
+            <a:r>
+              <a:rPr lang="en-US" dirty="0"/>
+              <a:t>For lower bounds is the same </a:t>
+            </a:r>
+            <a:endParaRPr lang="ru-KZ" dirty="0"/>
+          </a:p>
+        </p:txBody>
+      </p:sp>
+      <p:pic>
+        <p:nvPicPr>
+          <p:cNvPr id="4" name="Picture 3">
+            <a:extLst>
+              <a:ext uri="{FF2B5EF4-FFF2-40B4-BE49-F238E27FC236}">
+                <a16:creationId xmlns:a16="http://schemas.microsoft.com/office/drawing/2014/main" id="{1F009E37-A051-442E-86E1-973268DA9AF1}"/>
+              </a:ext>
+            </a:extLst>
+          </p:cNvPr>
+          <p:cNvPicPr>
+            <a:picLocks noChangeAspect="1"/>
+          </p:cNvPicPr>
+          <p:nvPr/>
+        </p:nvPicPr>
+        <p:blipFill>
+          <a:blip r:embed="rId2"/>
+          <a:stretch>
+            <a:fillRect/>
+          </a:stretch>
+        </p:blipFill>
+        <p:spPr>
+          <a:xfrm>
+            <a:off x="2232341" y="1754603"/>
+            <a:ext cx="2105423" cy="606857"/>
+          </a:xfrm>
+          <a:prstGeom prst="rect">
+            <a:avLst/>
+          </a:prstGeom>
+        </p:spPr>
+      </p:pic>
+      <p:pic>
+        <p:nvPicPr>
+          <p:cNvPr id="5" name="Picture 4">
+            <a:extLst>
+              <a:ext uri="{FF2B5EF4-FFF2-40B4-BE49-F238E27FC236}">
+                <a16:creationId xmlns:a16="http://schemas.microsoft.com/office/drawing/2014/main" id="{DE2C20CF-BF83-4742-80E7-80BC60C08357}"/>
+              </a:ext>
+            </a:extLst>
+          </p:cNvPr>
+          <p:cNvPicPr>
+            <a:picLocks noChangeAspect="1"/>
+          </p:cNvPicPr>
+          <p:nvPr/>
+        </p:nvPicPr>
+        <p:blipFill>
+          <a:blip r:embed="rId3"/>
+          <a:stretch>
+            <a:fillRect/>
+          </a:stretch>
+        </p:blipFill>
+        <p:spPr>
+          <a:xfrm>
+            <a:off x="2853405" y="2290438"/>
+            <a:ext cx="2123998" cy="606856"/>
+          </a:xfrm>
+          <a:prstGeom prst="rect">
+            <a:avLst/>
+          </a:prstGeom>
+        </p:spPr>
+      </p:pic>
+      <p:pic>
+        <p:nvPicPr>
+          <p:cNvPr id="6" name="Picture 5">
+            <a:extLst>
+              <a:ext uri="{FF2B5EF4-FFF2-40B4-BE49-F238E27FC236}">
+                <a16:creationId xmlns:a16="http://schemas.microsoft.com/office/drawing/2014/main" id="{865E105A-C6C3-4B4E-9F9D-0BBBFEB0403D}"/>
+              </a:ext>
+            </a:extLst>
+          </p:cNvPr>
+          <p:cNvPicPr>
+            <a:picLocks noChangeAspect="1"/>
+          </p:cNvPicPr>
+          <p:nvPr/>
+        </p:nvPicPr>
+        <p:blipFill>
+          <a:blip r:embed="rId4"/>
+          <a:stretch>
+            <a:fillRect/>
+          </a:stretch>
+        </p:blipFill>
+        <p:spPr>
+          <a:xfrm>
+            <a:off x="6096000" y="2735346"/>
+            <a:ext cx="4805779" cy="616590"/>
+          </a:xfrm>
+          <a:prstGeom prst="rect">
+            <a:avLst/>
+          </a:prstGeom>
+        </p:spPr>
+      </p:pic>
+      <p:pic>
+        <p:nvPicPr>
+          <p:cNvPr id="7" name="Picture 6">
+            <a:extLst>
+              <a:ext uri="{FF2B5EF4-FFF2-40B4-BE49-F238E27FC236}">
+                <a16:creationId xmlns:a16="http://schemas.microsoft.com/office/drawing/2014/main" id="{FC2DBEEB-C584-4320-9212-9F5F2B3E0BA6}"/>
+              </a:ext>
+            </a:extLst>
+          </p:cNvPr>
+          <p:cNvPicPr>
+            <a:picLocks noChangeAspect="1"/>
+          </p:cNvPicPr>
+          <p:nvPr/>
+        </p:nvPicPr>
+        <p:blipFill>
+          <a:blip r:embed="rId5"/>
+          <a:stretch>
+            <a:fillRect/>
+          </a:stretch>
+        </p:blipFill>
+        <p:spPr>
+          <a:xfrm>
+            <a:off x="4426482" y="3351936"/>
+            <a:ext cx="4687052" cy="535200"/>
+          </a:xfrm>
+          <a:prstGeom prst="rect">
+            <a:avLst/>
+          </a:prstGeom>
+        </p:spPr>
+      </p:pic>
+    </p:spTree>
+    <p:extLst>
+      <p:ext uri="{BB962C8B-B14F-4D97-AF65-F5344CB8AC3E}">
+        <p14:creationId xmlns:p14="http://schemas.microsoft.com/office/powerpoint/2010/main" val="1117083484"/>
+      </p:ext>
+    </p:extLst>
+  </p:cSld>
+  <p:clrMapOvr>
+    <a:masterClrMapping/>
+  </p:clrMapOvr>
+</p:sld>
+</file>
+
+<file path=ppt/slides/slide11.xml><?xml version="1.0" encoding="utf-8"?>
+<p:sld xmlns:a="http://schemas.openxmlformats.org/drawingml/2006/main" xmlns:r="http://schemas.openxmlformats.org/officeDocument/2006/relationships" xmlns:p="http://schemas.openxmlformats.org/presentationml/2006/main">
+  <p:cSld>
+    <p:spTree>
+      <p:nvGrpSpPr>
+        <p:cNvPr id="1" name=""/>
+        <p:cNvGrpSpPr/>
+        <p:nvPr/>
+      </p:nvGrpSpPr>
+      <p:grpSpPr>
+        <a:xfrm>
+          <a:off x="0" y="0"/>
+          <a:ext cx="0" cy="0"/>
+          <a:chOff x="0" y="0"/>
+          <a:chExt cx="0" cy="0"/>
+        </a:xfrm>
+      </p:grpSpPr>
+      <p:sp>
+        <p:nvSpPr>
+          <p:cNvPr id="2" name="Title 1">
+            <a:extLst>
+              <a:ext uri="{FF2B5EF4-FFF2-40B4-BE49-F238E27FC236}">
+                <a16:creationId xmlns:a16="http://schemas.microsoft.com/office/drawing/2014/main" id="{263E7B6F-4DE3-4DEE-AABE-9DB84CA4FC5B}"/>
+              </a:ext>
+            </a:extLst>
+          </p:cNvPr>
+          <p:cNvSpPr>
+            <a:spLocks noGrp="1"/>
+          </p:cNvSpPr>
+          <p:nvPr>
+            <p:ph type="title"/>
+          </p:nvPr>
+        </p:nvSpPr>
+        <p:spPr/>
+        <p:txBody>
+          <a:bodyPr/>
+          <a:lstStyle/>
+          <a:p>
+            <a:r>
+              <a:rPr lang="en-US" dirty="0"/>
+              <a:t>What have been done</a:t>
+            </a:r>
+            <a:endParaRPr lang="ru-KZ" dirty="0"/>
+          </a:p>
+        </p:txBody>
+      </p:sp>
+      <p:sp>
+        <p:nvSpPr>
+          <p:cNvPr id="3" name="Content Placeholder 2">
+            <a:extLst>
+              <a:ext uri="{FF2B5EF4-FFF2-40B4-BE49-F238E27FC236}">
+                <a16:creationId xmlns:a16="http://schemas.microsoft.com/office/drawing/2014/main" id="{2FE98792-2EB8-4339-AE82-033A60CC1483}"/>
+              </a:ext>
+            </a:extLst>
+          </p:cNvPr>
+          <p:cNvSpPr>
+            <a:spLocks noGrp="1"/>
+          </p:cNvSpPr>
+          <p:nvPr>
+            <p:ph idx="1"/>
+          </p:nvPr>
+        </p:nvSpPr>
+        <p:spPr/>
+        <p:txBody>
+          <a:bodyPr/>
+          <a:lstStyle/>
+          <a:p>
+            <a:r>
+              <a:rPr lang="en-US" dirty="0"/>
+              <a:t>Added </a:t>
+            </a:r>
+            <a:r>
+              <a:rPr lang="en-US" dirty="0" err="1"/>
+              <a:t>postgresql</a:t>
+            </a:r>
+            <a:r>
+              <a:rPr lang="en-US" dirty="0"/>
+              <a:t> and docker</a:t>
+            </a:r>
+            <a:endParaRPr lang="ru-KZ" dirty="0"/>
+          </a:p>
+        </p:txBody>
+      </p:sp>
+      <p:pic>
+        <p:nvPicPr>
+          <p:cNvPr id="4" name="Picture 3">
+            <a:extLst>
+              <a:ext uri="{FF2B5EF4-FFF2-40B4-BE49-F238E27FC236}">
+                <a16:creationId xmlns:a16="http://schemas.microsoft.com/office/drawing/2014/main" id="{4183394A-73B1-4269-A30F-5E7B736D5957}"/>
+              </a:ext>
+            </a:extLst>
+          </p:cNvPr>
+          <p:cNvPicPr>
+            <a:picLocks noChangeAspect="1"/>
+          </p:cNvPicPr>
+          <p:nvPr/>
+        </p:nvPicPr>
+        <p:blipFill>
+          <a:blip r:embed="rId2"/>
+          <a:stretch>
+            <a:fillRect/>
+          </a:stretch>
+        </p:blipFill>
+        <p:spPr>
+          <a:xfrm>
+            <a:off x="838200" y="2524929"/>
+            <a:ext cx="4237087" cy="3193057"/>
+          </a:xfrm>
+          <a:prstGeom prst="rect">
+            <a:avLst/>
+          </a:prstGeom>
+        </p:spPr>
+      </p:pic>
+    </p:spTree>
+    <p:extLst>
+      <p:ext uri="{BB962C8B-B14F-4D97-AF65-F5344CB8AC3E}">
+        <p14:creationId xmlns:p14="http://schemas.microsoft.com/office/powerpoint/2010/main" val="3308195364"/>
+      </p:ext>
+    </p:extLst>
+  </p:cSld>
+  <p:clrMapOvr>
+    <a:masterClrMapping/>
+  </p:clrMapOvr>
+</p:sld>
+</file>
+
+<file path=ppt/slides/slide12.xml><?xml version="1.0" encoding="utf-8"?>
+<p:sld xmlns:a="http://schemas.openxmlformats.org/drawingml/2006/main" xmlns:r="http://schemas.openxmlformats.org/officeDocument/2006/relationships" xmlns:p="http://schemas.openxmlformats.org/presentationml/2006/main">
+  <p:cSld>
+    <p:spTree>
+      <p:nvGrpSpPr>
+        <p:cNvPr id="1" name=""/>
+        <p:cNvGrpSpPr/>
+        <p:nvPr/>
+      </p:nvGrpSpPr>
+      <p:grpSpPr>
+        <a:xfrm>
+          <a:off x="0" y="0"/>
+          <a:ext cx="0" cy="0"/>
+          <a:chOff x="0" y="0"/>
+          <a:chExt cx="0" cy="0"/>
+        </a:xfrm>
+      </p:grpSpPr>
+      <p:sp>
+        <p:nvSpPr>
+          <p:cNvPr id="2" name="Title 1">
+            <a:extLst>
+              <a:ext uri="{FF2B5EF4-FFF2-40B4-BE49-F238E27FC236}">
+                <a16:creationId xmlns:a16="http://schemas.microsoft.com/office/drawing/2014/main" id="{BE6396BF-48D7-463D-95F1-33BC5A2668C6}"/>
+              </a:ext>
+            </a:extLst>
+          </p:cNvPr>
+          <p:cNvSpPr>
+            <a:spLocks noGrp="1"/>
+          </p:cNvSpPr>
+          <p:nvPr>
+            <p:ph type="title"/>
+          </p:nvPr>
+        </p:nvSpPr>
+        <p:spPr/>
+        <p:txBody>
+          <a:bodyPr/>
+          <a:lstStyle/>
+          <a:p>
+            <a:r>
+              <a:rPr lang="en-US" dirty="0"/>
+              <a:t>Implemented methods for loading data and saving to </a:t>
+            </a:r>
+            <a:r>
+              <a:rPr lang="en-US" dirty="0" err="1"/>
+              <a:t>db</a:t>
+            </a:r>
+            <a:endParaRPr lang="ru-KZ" dirty="0"/>
+          </a:p>
+        </p:txBody>
+      </p:sp>
+      <p:pic>
+        <p:nvPicPr>
+          <p:cNvPr id="5" name="Content Placeholder 4">
+            <a:extLst>
+              <a:ext uri="{FF2B5EF4-FFF2-40B4-BE49-F238E27FC236}">
+                <a16:creationId xmlns:a16="http://schemas.microsoft.com/office/drawing/2014/main" id="{2A7F155B-825D-47C9-8C52-9360D888FA92}"/>
+              </a:ext>
+            </a:extLst>
+          </p:cNvPr>
+          <p:cNvPicPr>
+            <a:picLocks noGrp="1" noChangeAspect="1"/>
+          </p:cNvPicPr>
+          <p:nvPr>
+            <p:ph idx="1"/>
+          </p:nvPr>
+        </p:nvPicPr>
+        <p:blipFill>
+          <a:blip r:embed="rId2"/>
+          <a:stretch>
+            <a:fillRect/>
+          </a:stretch>
+        </p:blipFill>
+        <p:spPr>
+          <a:xfrm>
+            <a:off x="1062083" y="4892006"/>
+            <a:ext cx="7262489" cy="1165961"/>
+          </a:xfrm>
+          <a:prstGeom prst="rect">
+            <a:avLst/>
+          </a:prstGeom>
+        </p:spPr>
+      </p:pic>
+      <p:pic>
+        <p:nvPicPr>
+          <p:cNvPr id="4" name="Picture 3">
+            <a:extLst>
+              <a:ext uri="{FF2B5EF4-FFF2-40B4-BE49-F238E27FC236}">
+                <a16:creationId xmlns:a16="http://schemas.microsoft.com/office/drawing/2014/main" id="{76C6A609-795D-44F2-852A-88D325CA1FB5}"/>
+              </a:ext>
+            </a:extLst>
+          </p:cNvPr>
+          <p:cNvPicPr>
+            <a:picLocks noChangeAspect="1"/>
+          </p:cNvPicPr>
+          <p:nvPr/>
+        </p:nvPicPr>
+        <p:blipFill>
+          <a:blip r:embed="rId3"/>
+          <a:stretch>
+            <a:fillRect/>
+          </a:stretch>
+        </p:blipFill>
+        <p:spPr>
+          <a:xfrm>
+            <a:off x="965286" y="2019713"/>
+            <a:ext cx="7456082" cy="2543268"/>
+          </a:xfrm>
+          <a:prstGeom prst="rect">
+            <a:avLst/>
+          </a:prstGeom>
+        </p:spPr>
+      </p:pic>
+    </p:spTree>
+    <p:extLst>
+      <p:ext uri="{BB962C8B-B14F-4D97-AF65-F5344CB8AC3E}">
+        <p14:creationId xmlns:p14="http://schemas.microsoft.com/office/powerpoint/2010/main" val="1383790133"/>
+      </p:ext>
+    </p:extLst>
+  </p:cSld>
+  <p:clrMapOvr>
+    <a:masterClrMapping/>
+  </p:clrMapOvr>
+</p:sld>
+</file>
+
+<file path=ppt/slides/slide13.xml><?xml version="1.0" encoding="utf-8"?>
+<p:sld xmlns:a="http://schemas.openxmlformats.org/drawingml/2006/main" xmlns:r="http://schemas.openxmlformats.org/officeDocument/2006/relationships" xmlns:p="http://schemas.openxmlformats.org/presentationml/2006/main">
+  <p:cSld>
+    <p:spTree>
+      <p:nvGrpSpPr>
+        <p:cNvPr id="1" name=""/>
+        <p:cNvGrpSpPr/>
+        <p:nvPr/>
+      </p:nvGrpSpPr>
+      <p:grpSpPr>
+        <a:xfrm>
+          <a:off x="0" y="0"/>
+          <a:ext cx="0" cy="0"/>
+          <a:chOff x="0" y="0"/>
+          <a:chExt cx="0" cy="0"/>
+        </a:xfrm>
+      </p:grpSpPr>
+      <p:sp>
+        <p:nvSpPr>
+          <p:cNvPr id="2" name="Title 1">
+            <a:extLst>
+              <a:ext uri="{FF2B5EF4-FFF2-40B4-BE49-F238E27FC236}">
+                <a16:creationId xmlns:a16="http://schemas.microsoft.com/office/drawing/2014/main" id="{6280F9B4-9EAF-4FB8-AFE3-480DB0D88C85}"/>
+              </a:ext>
+            </a:extLst>
+          </p:cNvPr>
+          <p:cNvSpPr>
+            <a:spLocks noGrp="1"/>
+          </p:cNvSpPr>
+          <p:nvPr>
+            <p:ph type="title"/>
+          </p:nvPr>
+        </p:nvSpPr>
+        <p:spPr/>
+        <p:txBody>
+          <a:bodyPr/>
+          <a:lstStyle/>
+          <a:p>
+            <a:r>
+              <a:rPr lang="en-US" dirty="0"/>
+              <a:t>Added backend (Flask) and OLS model with data transformation</a:t>
+            </a:r>
+            <a:endParaRPr lang="ru-KZ" dirty="0"/>
+          </a:p>
+        </p:txBody>
+      </p:sp>
+      <p:pic>
+        <p:nvPicPr>
+          <p:cNvPr id="4" name="Content Placeholder 3">
+            <a:extLst>
+              <a:ext uri="{FF2B5EF4-FFF2-40B4-BE49-F238E27FC236}">
+                <a16:creationId xmlns:a16="http://schemas.microsoft.com/office/drawing/2014/main" id="{0BB71C2D-CBDD-4BF0-A847-B25B5335192E}"/>
+              </a:ext>
+            </a:extLst>
+          </p:cNvPr>
+          <p:cNvPicPr>
+            <a:picLocks noGrp="1" noChangeAspect="1"/>
+          </p:cNvPicPr>
+          <p:nvPr>
+            <p:ph idx="1"/>
+          </p:nvPr>
+        </p:nvPicPr>
+        <p:blipFill>
+          <a:blip r:embed="rId2"/>
+          <a:stretch>
+            <a:fillRect/>
+          </a:stretch>
+        </p:blipFill>
+        <p:spPr>
+          <a:xfrm>
+            <a:off x="670090" y="1622352"/>
+            <a:ext cx="5425910" cy="3071126"/>
+          </a:xfrm>
+          <a:prstGeom prst="rect">
+            <a:avLst/>
+          </a:prstGeom>
+        </p:spPr>
+      </p:pic>
+      <p:pic>
+        <p:nvPicPr>
+          <p:cNvPr id="5" name="Picture 4">
+            <a:extLst>
+              <a:ext uri="{FF2B5EF4-FFF2-40B4-BE49-F238E27FC236}">
+                <a16:creationId xmlns:a16="http://schemas.microsoft.com/office/drawing/2014/main" id="{CB8F85B9-9DB8-4958-9828-C0989584148C}"/>
+              </a:ext>
+            </a:extLst>
+          </p:cNvPr>
+          <p:cNvPicPr>
+            <a:picLocks noChangeAspect="1"/>
+          </p:cNvPicPr>
+          <p:nvPr/>
+        </p:nvPicPr>
+        <p:blipFill>
+          <a:blip r:embed="rId3"/>
+          <a:stretch>
+            <a:fillRect/>
+          </a:stretch>
+        </p:blipFill>
+        <p:spPr>
+          <a:xfrm>
+            <a:off x="772969" y="5151639"/>
+            <a:ext cx="5220152" cy="1341236"/>
+          </a:xfrm>
+          <a:prstGeom prst="rect">
+            <a:avLst/>
+          </a:prstGeom>
+        </p:spPr>
+      </p:pic>
+    </p:spTree>
+    <p:extLst>
+      <p:ext uri="{BB962C8B-B14F-4D97-AF65-F5344CB8AC3E}">
+        <p14:creationId xmlns:p14="http://schemas.microsoft.com/office/powerpoint/2010/main" val="3473840003"/>
+      </p:ext>
+    </p:extLst>
+  </p:cSld>
+  <p:clrMapOvr>
+    <a:masterClrMapping/>
+  </p:clrMapOvr>
+</p:sld>
+</file>
+
+<file path=ppt/slides/slide14.xml><?xml version="1.0" encoding="utf-8"?>
+<p:sld xmlns:a="http://schemas.openxmlformats.org/drawingml/2006/main" xmlns:r="http://schemas.openxmlformats.org/officeDocument/2006/relationships" xmlns:p="http://schemas.openxmlformats.org/presentationml/2006/main">
+  <p:cSld>
+    <p:spTree>
+      <p:nvGrpSpPr>
+        <p:cNvPr id="1" name=""/>
+        <p:cNvGrpSpPr/>
+        <p:nvPr/>
+      </p:nvGrpSpPr>
+      <p:grpSpPr>
+        <a:xfrm>
+          <a:off x="0" y="0"/>
+          <a:ext cx="0" cy="0"/>
+          <a:chOff x="0" y="0"/>
+          <a:chExt cx="0" cy="0"/>
+        </a:xfrm>
+      </p:grpSpPr>
+      <p:sp>
+        <p:nvSpPr>
+          <p:cNvPr id="2" name="Title 1">
+            <a:extLst>
+              <a:ext uri="{FF2B5EF4-FFF2-40B4-BE49-F238E27FC236}">
                 <a16:creationId xmlns:a16="http://schemas.microsoft.com/office/drawing/2014/main" id="{8AB42A14-4154-40ED-867F-BBE30926D2C3}"/>
               </a:ext>
             </a:extLst>
@@ -3624,7 +4232,7 @@
 </p:sld>
 </file>
 
-<file path=ppt/slides/slide11.xml><?xml version="1.0" encoding="utf-8"?>
+<file path=ppt/slides/slide15.xml><?xml version="1.0" encoding="utf-8"?>
 <p:sld xmlns:a="http://schemas.openxmlformats.org/drawingml/2006/main" xmlns:r="http://schemas.openxmlformats.org/officeDocument/2006/relationships" xmlns:p="http://schemas.openxmlformats.org/presentationml/2006/main">
   <p:cSld>
     <p:spTree>
@@ -4201,7 +4809,7 @@
           <p:cNvPr id="2" name="Title 1">
             <a:extLst>
               <a:ext uri="{FF2B5EF4-FFF2-40B4-BE49-F238E27FC236}">
-                <a16:creationId xmlns:a16="http://schemas.microsoft.com/office/drawing/2014/main" id="{D2666674-A85F-407D-AA5C-2B1F499378DB}"/>
+                <a16:creationId xmlns:a16="http://schemas.microsoft.com/office/drawing/2014/main" id="{E920EB2B-3B55-40E0-8EEE-4A44DD3EA957}"/>
               </a:ext>
             </a:extLst>
           </p:cNvPr>
@@ -4219,74 +4827,106 @@
           <a:p>
             <a:r>
               <a:rPr lang="en-US" dirty="0"/>
-              <a:t>Methods</a:t>
+              <a:t>Background</a:t>
             </a:r>
             <a:endParaRPr lang="ru-KZ" dirty="0"/>
           </a:p>
         </p:txBody>
       </p:sp>
-      <p:sp>
-        <p:nvSpPr>
-          <p:cNvPr id="3" name="Content Placeholder 2">
-            <a:extLst>
-              <a:ext uri="{FF2B5EF4-FFF2-40B4-BE49-F238E27FC236}">
-                <a16:creationId xmlns:a16="http://schemas.microsoft.com/office/drawing/2014/main" id="{54937C49-72E8-4CD7-BDE6-4438CF7C88EF}"/>
-              </a:ext>
-            </a:extLst>
-          </p:cNvPr>
-          <p:cNvSpPr>
-            <a:spLocks noGrp="1"/>
-          </p:cNvSpPr>
-          <p:nvPr>
-            <p:ph idx="1"/>
-          </p:nvPr>
-        </p:nvSpPr>
-        <p:spPr/>
-        <p:txBody>
-          <a:bodyPr/>
-          <a:lstStyle/>
-          <a:p>
-            <a:r>
-              <a:rPr lang="en-US" dirty="0"/>
-              <a:t>Classical time series methods: ARIMA, GRACH, stochastic processes</a:t>
-            </a:r>
-          </a:p>
-          <a:p>
-            <a:r>
-              <a:rPr lang="en-US" dirty="0"/>
-              <a:t>ML methods: </a:t>
-            </a:r>
-          </a:p>
-          <a:p>
-            <a:pPr lvl="1"/>
-            <a:r>
-              <a:rPr lang="en-US" dirty="0"/>
-              <a:t>Non-sequential: NN, regression </a:t>
-            </a:r>
-            <a:r>
-              <a:rPr lang="en-US" dirty="0" err="1"/>
-              <a:t>etc</a:t>
-            </a:r>
-            <a:endParaRPr lang="en-US" dirty="0"/>
-          </a:p>
-          <a:p>
-            <a:pPr lvl="1"/>
-            <a:r>
-              <a:rPr lang="en-US" dirty="0"/>
-              <a:t>Sequential: RNN, LSTM </a:t>
-            </a:r>
-            <a:r>
-              <a:rPr lang="en-US" dirty="0" err="1"/>
-              <a:t>etc</a:t>
-            </a:r>
-            <a:endParaRPr lang="ru-KZ" dirty="0"/>
-          </a:p>
-        </p:txBody>
-      </p:sp>
+      <p:pic>
+        <p:nvPicPr>
+          <p:cNvPr id="4" name="Picture 3">
+            <a:extLst>
+              <a:ext uri="{FF2B5EF4-FFF2-40B4-BE49-F238E27FC236}">
+                <a16:creationId xmlns:a16="http://schemas.microsoft.com/office/drawing/2014/main" id="{317F45BD-7BB8-47C3-8B06-CE94EBED39B0}"/>
+              </a:ext>
+            </a:extLst>
+          </p:cNvPr>
+          <p:cNvPicPr>
+            <a:picLocks noChangeAspect="1"/>
+          </p:cNvPicPr>
+          <p:nvPr/>
+        </p:nvPicPr>
+        <p:blipFill>
+          <a:blip r:embed="rId2"/>
+          <a:stretch>
+            <a:fillRect/>
+          </a:stretch>
+        </p:blipFill>
+        <p:spPr>
+          <a:xfrm>
+            <a:off x="4496517" y="151531"/>
+            <a:ext cx="5479255" cy="1752752"/>
+          </a:xfrm>
+          <a:prstGeom prst="rect">
+            <a:avLst/>
+          </a:prstGeom>
+        </p:spPr>
+      </p:pic>
+      <p:pic>
+        <p:nvPicPr>
+          <p:cNvPr id="5" name="Picture 4">
+            <a:extLst>
+              <a:ext uri="{FF2B5EF4-FFF2-40B4-BE49-F238E27FC236}">
+                <a16:creationId xmlns:a16="http://schemas.microsoft.com/office/drawing/2014/main" id="{E50FE699-4B5A-432D-8F45-9EB0D8A8C20E}"/>
+              </a:ext>
+            </a:extLst>
+          </p:cNvPr>
+          <p:cNvPicPr>
+            <a:picLocks noChangeAspect="1"/>
+          </p:cNvPicPr>
+          <p:nvPr/>
+        </p:nvPicPr>
+        <p:blipFill>
+          <a:blip r:embed="rId3"/>
+          <a:stretch>
+            <a:fillRect/>
+          </a:stretch>
+        </p:blipFill>
+        <p:spPr>
+          <a:xfrm>
+            <a:off x="8216090" y="2343831"/>
+            <a:ext cx="3137710" cy="2799669"/>
+          </a:xfrm>
+          <a:prstGeom prst="rect">
+            <a:avLst/>
+          </a:prstGeom>
+        </p:spPr>
+      </p:pic>
+      <p:pic>
+        <p:nvPicPr>
+          <p:cNvPr id="6" name="Picture 5">
+            <a:extLst>
+              <a:ext uri="{FF2B5EF4-FFF2-40B4-BE49-F238E27FC236}">
+                <a16:creationId xmlns:a16="http://schemas.microsoft.com/office/drawing/2014/main" id="{900EAAC3-17F2-49C8-9C8D-F0446EBBA263}"/>
+              </a:ext>
+            </a:extLst>
+          </p:cNvPr>
+          <p:cNvPicPr>
+            <a:picLocks noChangeAspect="1"/>
+          </p:cNvPicPr>
+          <p:nvPr/>
+        </p:nvPicPr>
+        <p:blipFill>
+          <a:blip r:embed="rId4"/>
+          <a:stretch>
+            <a:fillRect/>
+          </a:stretch>
+        </p:blipFill>
+        <p:spPr>
+          <a:xfrm>
+            <a:off x="957866" y="2445935"/>
+            <a:ext cx="7150571" cy="3513994"/>
+          </a:xfrm>
+          <a:prstGeom prst="rect">
+            <a:avLst/>
+          </a:prstGeom>
+        </p:spPr>
+      </p:pic>
     </p:spTree>
     <p:extLst>
       <p:ext uri="{BB962C8B-B14F-4D97-AF65-F5344CB8AC3E}">
-        <p14:creationId xmlns:p14="http://schemas.microsoft.com/office/powerpoint/2010/main" val="1364394069"/>
+        <p14:creationId xmlns:p14="http://schemas.microsoft.com/office/powerpoint/2010/main" val="4144629539"/>
       </p:ext>
     </p:extLst>
   </p:cSld>
@@ -4313,94 +4953,12 @@
           <a:chExt cx="0" cy="0"/>
         </a:xfrm>
       </p:grpSpPr>
-      <p:sp>
-        <p:nvSpPr>
-          <p:cNvPr id="2" name="Title 1">
-            <a:extLst>
-              <a:ext uri="{FF2B5EF4-FFF2-40B4-BE49-F238E27FC236}">
-                <a16:creationId xmlns:a16="http://schemas.microsoft.com/office/drawing/2014/main" id="{9A4273E8-CF08-4F37-B1CC-AF52FE1208AF}"/>
-              </a:ext>
-            </a:extLst>
-          </p:cNvPr>
-          <p:cNvSpPr>
-            <a:spLocks noGrp="1"/>
-          </p:cNvSpPr>
-          <p:nvPr>
-            <p:ph type="title"/>
-          </p:nvPr>
-        </p:nvSpPr>
-        <p:spPr/>
-        <p:txBody>
-          <a:bodyPr/>
-          <a:lstStyle/>
-          <a:p>
-            <a:r>
-              <a:rPr lang="en-US" dirty="0"/>
-              <a:t>Formulization for supervised learning</a:t>
-            </a:r>
-            <a:endParaRPr lang="ru-KZ" dirty="0"/>
-          </a:p>
-        </p:txBody>
-      </p:sp>
-      <p:sp>
-        <p:nvSpPr>
-          <p:cNvPr id="3" name="Content Placeholder 2">
-            <a:extLst>
-              <a:ext uri="{FF2B5EF4-FFF2-40B4-BE49-F238E27FC236}">
-                <a16:creationId xmlns:a16="http://schemas.microsoft.com/office/drawing/2014/main" id="{70C5A7DC-AE20-487B-9D71-F6D9365C42F1}"/>
-              </a:ext>
-            </a:extLst>
-          </p:cNvPr>
-          <p:cNvSpPr>
-            <a:spLocks noGrp="1"/>
-          </p:cNvSpPr>
-          <p:nvPr>
-            <p:ph idx="1"/>
-          </p:nvPr>
-        </p:nvSpPr>
-        <p:spPr/>
-        <p:txBody>
-          <a:bodyPr/>
-          <a:lstStyle/>
-          <a:p>
-            <a:r>
-              <a:rPr lang="en-US" dirty="0"/>
-              <a:t>Given</a:t>
-            </a:r>
-          </a:p>
-          <a:p>
-            <a:r>
-              <a:rPr lang="en-US" dirty="0"/>
-              <a:t>Predictions</a:t>
-            </a:r>
-          </a:p>
-          <a:p>
-            <a:r>
-              <a:rPr lang="en-US" dirty="0"/>
-              <a:t>Algorithm to create upper bound</a:t>
-            </a:r>
-          </a:p>
-          <a:p>
-            <a:r>
-              <a:rPr lang="en-US" dirty="0"/>
-              <a:t>Algorithm is iterative</a:t>
-            </a:r>
-          </a:p>
-          <a:p>
-            <a:r>
-              <a:rPr lang="en-US" dirty="0"/>
-              <a:t>For lower bounds is the same </a:t>
-            </a:r>
-            <a:endParaRPr lang="ru-KZ" dirty="0"/>
-          </a:p>
-        </p:txBody>
-      </p:sp>
       <p:pic>
         <p:nvPicPr>
           <p:cNvPr id="4" name="Picture 3">
             <a:extLst>
               <a:ext uri="{FF2B5EF4-FFF2-40B4-BE49-F238E27FC236}">
-                <a16:creationId xmlns:a16="http://schemas.microsoft.com/office/drawing/2014/main" id="{1F009E37-A051-442E-86E1-973268DA9AF1}"/>
+                <a16:creationId xmlns:a16="http://schemas.microsoft.com/office/drawing/2014/main" id="{C2ED1BC0-D49B-459D-92CF-DDF31CF6135F}"/>
               </a:ext>
             </a:extLst>
           </p:cNvPr>
@@ -4417,8 +4975,8 @@
         </p:blipFill>
         <p:spPr>
           <a:xfrm>
-            <a:off x="2232341" y="1754603"/>
-            <a:ext cx="2105423" cy="606857"/>
+            <a:off x="2245964" y="444397"/>
+            <a:ext cx="7700071" cy="1253775"/>
           </a:xfrm>
           <a:prstGeom prst="rect">
             <a:avLst/>
@@ -4430,7 +4988,7 @@
           <p:cNvPr id="5" name="Picture 4">
             <a:extLst>
               <a:ext uri="{FF2B5EF4-FFF2-40B4-BE49-F238E27FC236}">
-                <a16:creationId xmlns:a16="http://schemas.microsoft.com/office/drawing/2014/main" id="{DE2C20CF-BF83-4742-80E7-80BC60C08357}"/>
+                <a16:creationId xmlns:a16="http://schemas.microsoft.com/office/drawing/2014/main" id="{1F5F39B1-5118-475C-8E53-EE64CFD23BD5}"/>
               </a:ext>
             </a:extLst>
           </p:cNvPr>
@@ -4447,8 +5005,8 @@
         </p:blipFill>
         <p:spPr>
           <a:xfrm>
-            <a:off x="2853405" y="2290438"/>
-            <a:ext cx="2123998" cy="606856"/>
+            <a:off x="192293" y="1698172"/>
+            <a:ext cx="4107341" cy="3981091"/>
           </a:xfrm>
           <a:prstGeom prst="rect">
             <a:avLst/>
@@ -4460,7 +5018,7 @@
           <p:cNvPr id="6" name="Picture 5">
             <a:extLst>
               <a:ext uri="{FF2B5EF4-FFF2-40B4-BE49-F238E27FC236}">
-                <a16:creationId xmlns:a16="http://schemas.microsoft.com/office/drawing/2014/main" id="{865E105A-C6C3-4B4E-9F9D-0BBBFEB0403D}"/>
+                <a16:creationId xmlns:a16="http://schemas.microsoft.com/office/drawing/2014/main" id="{E1FA2C69-3AC2-4F39-B418-5C4F5C772C07}"/>
               </a:ext>
             </a:extLst>
           </p:cNvPr>
@@ -4477,38 +5035,8 @@
         </p:blipFill>
         <p:spPr>
           <a:xfrm>
-            <a:off x="6096000" y="2735346"/>
-            <a:ext cx="4805779" cy="616590"/>
-          </a:xfrm>
-          <a:prstGeom prst="rect">
-            <a:avLst/>
-          </a:prstGeom>
-        </p:spPr>
-      </p:pic>
-      <p:pic>
-        <p:nvPicPr>
-          <p:cNvPr id="7" name="Picture 6">
-            <a:extLst>
-              <a:ext uri="{FF2B5EF4-FFF2-40B4-BE49-F238E27FC236}">
-                <a16:creationId xmlns:a16="http://schemas.microsoft.com/office/drawing/2014/main" id="{FC2DBEEB-C584-4320-9212-9F5F2B3E0BA6}"/>
-              </a:ext>
-            </a:extLst>
-          </p:cNvPr>
-          <p:cNvPicPr>
-            <a:picLocks noChangeAspect="1"/>
-          </p:cNvPicPr>
-          <p:nvPr/>
-        </p:nvPicPr>
-        <p:blipFill>
-          <a:blip r:embed="rId5"/>
-          <a:stretch>
-            <a:fillRect/>
-          </a:stretch>
-        </p:blipFill>
-        <p:spPr>
-          <a:xfrm>
-            <a:off x="4426482" y="3351936"/>
-            <a:ext cx="4687052" cy="535200"/>
+            <a:off x="4535773" y="1910443"/>
+            <a:ext cx="7463934" cy="3249385"/>
           </a:xfrm>
           <a:prstGeom prst="rect">
             <a:avLst/>
@@ -4518,7 +5046,7 @@
     </p:spTree>
     <p:extLst>
       <p:ext uri="{BB962C8B-B14F-4D97-AF65-F5344CB8AC3E}">
-        <p14:creationId xmlns:p14="http://schemas.microsoft.com/office/powerpoint/2010/main" val="1117083484"/>
+        <p14:creationId xmlns:p14="http://schemas.microsoft.com/office/powerpoint/2010/main" val="1707633647"/>
       </p:ext>
     </p:extLst>
   </p:cSld>
@@ -4545,78 +5073,12 @@
           <a:chExt cx="0" cy="0"/>
         </a:xfrm>
       </p:grpSpPr>
-      <p:sp>
-        <p:nvSpPr>
-          <p:cNvPr id="2" name="Title 1">
-            <a:extLst>
-              <a:ext uri="{FF2B5EF4-FFF2-40B4-BE49-F238E27FC236}">
-                <a16:creationId xmlns:a16="http://schemas.microsoft.com/office/drawing/2014/main" id="{263E7B6F-4DE3-4DEE-AABE-9DB84CA4FC5B}"/>
-              </a:ext>
-            </a:extLst>
-          </p:cNvPr>
-          <p:cNvSpPr>
-            <a:spLocks noGrp="1"/>
-          </p:cNvSpPr>
-          <p:nvPr>
-            <p:ph type="title"/>
-          </p:nvPr>
-        </p:nvSpPr>
-        <p:spPr/>
-        <p:txBody>
-          <a:bodyPr/>
-          <a:lstStyle/>
-          <a:p>
-            <a:r>
-              <a:rPr lang="en-US" dirty="0"/>
-              <a:t>What have been done</a:t>
-            </a:r>
-            <a:endParaRPr lang="ru-KZ" dirty="0"/>
-          </a:p>
-        </p:txBody>
-      </p:sp>
-      <p:sp>
-        <p:nvSpPr>
-          <p:cNvPr id="3" name="Content Placeholder 2">
-            <a:extLst>
-              <a:ext uri="{FF2B5EF4-FFF2-40B4-BE49-F238E27FC236}">
-                <a16:creationId xmlns:a16="http://schemas.microsoft.com/office/drawing/2014/main" id="{2FE98792-2EB8-4339-AE82-033A60CC1483}"/>
-              </a:ext>
-            </a:extLst>
-          </p:cNvPr>
-          <p:cNvSpPr>
-            <a:spLocks noGrp="1"/>
-          </p:cNvSpPr>
-          <p:nvPr>
-            <p:ph idx="1"/>
-          </p:nvPr>
-        </p:nvSpPr>
-        <p:spPr/>
-        <p:txBody>
-          <a:bodyPr/>
-          <a:lstStyle/>
-          <a:p>
-            <a:r>
-              <a:rPr lang="en-US" dirty="0"/>
-              <a:t>Added </a:t>
-            </a:r>
-            <a:r>
-              <a:rPr lang="en-US" dirty="0" err="1"/>
-              <a:t>postgresql</a:t>
-            </a:r>
-            <a:r>
-              <a:rPr lang="en-US" dirty="0"/>
-              <a:t> and docker</a:t>
-            </a:r>
-            <a:endParaRPr lang="ru-KZ" dirty="0"/>
-          </a:p>
-        </p:txBody>
-      </p:sp>
       <p:pic>
         <p:nvPicPr>
           <p:cNvPr id="4" name="Picture 3">
             <a:extLst>
               <a:ext uri="{FF2B5EF4-FFF2-40B4-BE49-F238E27FC236}">
-                <a16:creationId xmlns:a16="http://schemas.microsoft.com/office/drawing/2014/main" id="{4183394A-73B1-4269-A30F-5E7B736D5957}"/>
+                <a16:creationId xmlns:a16="http://schemas.microsoft.com/office/drawing/2014/main" id="{E957E961-B1EF-4687-8E58-057E7A0339BD}"/>
               </a:ext>
             </a:extLst>
           </p:cNvPr>
@@ -4633,8 +5095,68 @@
         </p:blipFill>
         <p:spPr>
           <a:xfrm>
-            <a:off x="838200" y="2524929"/>
-            <a:ext cx="4237087" cy="3193057"/>
+            <a:off x="4345681" y="486027"/>
+            <a:ext cx="3500637" cy="559002"/>
+          </a:xfrm>
+          <a:prstGeom prst="rect">
+            <a:avLst/>
+          </a:prstGeom>
+        </p:spPr>
+      </p:pic>
+      <p:pic>
+        <p:nvPicPr>
+          <p:cNvPr id="5" name="Picture 4">
+            <a:extLst>
+              <a:ext uri="{FF2B5EF4-FFF2-40B4-BE49-F238E27FC236}">
+                <a16:creationId xmlns:a16="http://schemas.microsoft.com/office/drawing/2014/main" id="{70F42E06-7FD4-422A-A150-D0DF8424F585}"/>
+              </a:ext>
+            </a:extLst>
+          </p:cNvPr>
+          <p:cNvPicPr>
+            <a:picLocks noChangeAspect="1"/>
+          </p:cNvPicPr>
+          <p:nvPr/>
+        </p:nvPicPr>
+        <p:blipFill>
+          <a:blip r:embed="rId3"/>
+          <a:stretch>
+            <a:fillRect/>
+          </a:stretch>
+        </p:blipFill>
+        <p:spPr>
+          <a:xfrm>
+            <a:off x="3289518" y="1045029"/>
+            <a:ext cx="5144878" cy="3265471"/>
+          </a:xfrm>
+          <a:prstGeom prst="rect">
+            <a:avLst/>
+          </a:prstGeom>
+        </p:spPr>
+      </p:pic>
+      <p:pic>
+        <p:nvPicPr>
+          <p:cNvPr id="6" name="Picture 5">
+            <a:extLst>
+              <a:ext uri="{FF2B5EF4-FFF2-40B4-BE49-F238E27FC236}">
+                <a16:creationId xmlns:a16="http://schemas.microsoft.com/office/drawing/2014/main" id="{81AEC221-DDA1-4AC1-A1B3-26237DD8D458}"/>
+              </a:ext>
+            </a:extLst>
+          </p:cNvPr>
+          <p:cNvPicPr>
+            <a:picLocks noChangeAspect="1"/>
+          </p:cNvPicPr>
+          <p:nvPr/>
+        </p:nvPicPr>
+        <p:blipFill>
+          <a:blip r:embed="rId4"/>
+          <a:stretch>
+            <a:fillRect/>
+          </a:stretch>
+        </p:blipFill>
+        <p:spPr>
+          <a:xfrm>
+            <a:off x="2364074" y="4322015"/>
+            <a:ext cx="6995766" cy="2049958"/>
           </a:xfrm>
           <a:prstGeom prst="rect">
             <a:avLst/>
@@ -4644,7 +5166,7 @@
     </p:spTree>
     <p:extLst>
       <p:ext uri="{BB962C8B-B14F-4D97-AF65-F5344CB8AC3E}">
-        <p14:creationId xmlns:p14="http://schemas.microsoft.com/office/powerpoint/2010/main" val="3308195364"/>
+        <p14:creationId xmlns:p14="http://schemas.microsoft.com/office/powerpoint/2010/main" val="3171762256"/>
       </p:ext>
     </p:extLst>
   </p:cSld>
@@ -4671,54 +5193,19 @@
           <a:chExt cx="0" cy="0"/>
         </a:xfrm>
       </p:grpSpPr>
-      <p:sp>
-        <p:nvSpPr>
-          <p:cNvPr id="2" name="Title 1">
-            <a:extLst>
-              <a:ext uri="{FF2B5EF4-FFF2-40B4-BE49-F238E27FC236}">
-                <a16:creationId xmlns:a16="http://schemas.microsoft.com/office/drawing/2014/main" id="{BE6396BF-48D7-463D-95F1-33BC5A2668C6}"/>
-              </a:ext>
-            </a:extLst>
-          </p:cNvPr>
-          <p:cNvSpPr>
-            <a:spLocks noGrp="1"/>
-          </p:cNvSpPr>
-          <p:nvPr>
-            <p:ph type="title"/>
-          </p:nvPr>
-        </p:nvSpPr>
-        <p:spPr/>
-        <p:txBody>
-          <a:bodyPr/>
-          <a:lstStyle/>
-          <a:p>
-            <a:r>
-              <a:rPr lang="en-US" dirty="0"/>
-              <a:t>Implemented methods for loading data and saving to </a:t>
-            </a:r>
-            <a:r>
-              <a:rPr lang="en-US" dirty="0" err="1"/>
-              <a:t>db</a:t>
-            </a:r>
-            <a:endParaRPr lang="ru-KZ" dirty="0"/>
-          </a:p>
-        </p:txBody>
-      </p:sp>
       <p:pic>
         <p:nvPicPr>
-          <p:cNvPr id="5" name="Content Placeholder 4">
-            <a:extLst>
-              <a:ext uri="{FF2B5EF4-FFF2-40B4-BE49-F238E27FC236}">
-                <a16:creationId xmlns:a16="http://schemas.microsoft.com/office/drawing/2014/main" id="{2A7F155B-825D-47C9-8C52-9360D888FA92}"/>
+          <p:cNvPr id="4" name="Picture 3">
+            <a:extLst>
+              <a:ext uri="{FF2B5EF4-FFF2-40B4-BE49-F238E27FC236}">
+                <a16:creationId xmlns:a16="http://schemas.microsoft.com/office/drawing/2014/main" id="{28FB12BE-1C15-4EDB-BBBA-7BE39246363D}"/>
               </a:ext>
             </a:extLst>
           </p:cNvPr>
           <p:cNvPicPr>
-            <a:picLocks noGrp="1" noChangeAspect="1"/>
+            <a:picLocks noChangeAspect="1"/>
           </p:cNvPicPr>
-          <p:nvPr>
-            <p:ph idx="1"/>
-          </p:nvPr>
+          <p:nvPr/>
         </p:nvPicPr>
         <p:blipFill>
           <a:blip r:embed="rId2"/>
@@ -4728,8 +5215,8 @@
         </p:blipFill>
         <p:spPr>
           <a:xfrm>
-            <a:off x="1062083" y="4892006"/>
-            <a:ext cx="7262489" cy="1165961"/>
+            <a:off x="933538" y="1475986"/>
+            <a:ext cx="4258461" cy="2181614"/>
           </a:xfrm>
           <a:prstGeom prst="rect">
             <a:avLst/>
@@ -4738,10 +5225,10 @@
       </p:pic>
       <p:pic>
         <p:nvPicPr>
-          <p:cNvPr id="4" name="Picture 3">
-            <a:extLst>
-              <a:ext uri="{FF2B5EF4-FFF2-40B4-BE49-F238E27FC236}">
-                <a16:creationId xmlns:a16="http://schemas.microsoft.com/office/drawing/2014/main" id="{76C6A609-795D-44F2-852A-88D325CA1FB5}"/>
+          <p:cNvPr id="5" name="Picture 4">
+            <a:extLst>
+              <a:ext uri="{FF2B5EF4-FFF2-40B4-BE49-F238E27FC236}">
+                <a16:creationId xmlns:a16="http://schemas.microsoft.com/office/drawing/2014/main" id="{698A2FC2-5B77-4E94-B88D-791D4B7AA3A6}"/>
               </a:ext>
             </a:extLst>
           </p:cNvPr>
@@ -4758,8 +5245,8 @@
         </p:blipFill>
         <p:spPr>
           <a:xfrm>
-            <a:off x="965286" y="2019713"/>
-            <a:ext cx="7456082" cy="2543268"/>
+            <a:off x="5191999" y="1053782"/>
+            <a:ext cx="6484245" cy="4191774"/>
           </a:xfrm>
           <a:prstGeom prst="rect">
             <a:avLst/>
@@ -4769,7 +5256,7 @@
     </p:spTree>
     <p:extLst>
       <p:ext uri="{BB962C8B-B14F-4D97-AF65-F5344CB8AC3E}">
-        <p14:creationId xmlns:p14="http://schemas.microsoft.com/office/powerpoint/2010/main" val="1383790133"/>
+        <p14:creationId xmlns:p14="http://schemas.microsoft.com/office/powerpoint/2010/main" val="2360405572"/>
       </p:ext>
     </p:extLst>
   </p:cSld>
@@ -4801,7 +5288,7 @@
           <p:cNvPr id="2" name="Title 1">
             <a:extLst>
               <a:ext uri="{FF2B5EF4-FFF2-40B4-BE49-F238E27FC236}">
-                <a16:creationId xmlns:a16="http://schemas.microsoft.com/office/drawing/2014/main" id="{6280F9B4-9EAF-4FB8-AFE3-480DB0D88C85}"/>
+                <a16:creationId xmlns:a16="http://schemas.microsoft.com/office/drawing/2014/main" id="{D2666674-A85F-407D-AA5C-2B1F499378DB}"/>
               </a:ext>
             </a:extLst>
           </p:cNvPr>
@@ -4819,78 +5306,74 @@
           <a:p>
             <a:r>
               <a:rPr lang="en-US" dirty="0"/>
-              <a:t>Added backend (Flask) and OLS model with data transformation</a:t>
+              <a:t>Methods</a:t>
             </a:r>
             <a:endParaRPr lang="ru-KZ" dirty="0"/>
           </a:p>
         </p:txBody>
       </p:sp>
-      <p:pic>
-        <p:nvPicPr>
-          <p:cNvPr id="4" name="Content Placeholder 3">
-            <a:extLst>
-              <a:ext uri="{FF2B5EF4-FFF2-40B4-BE49-F238E27FC236}">
-                <a16:creationId xmlns:a16="http://schemas.microsoft.com/office/drawing/2014/main" id="{0BB71C2D-CBDD-4BF0-A847-B25B5335192E}"/>
-              </a:ext>
-            </a:extLst>
-          </p:cNvPr>
-          <p:cNvPicPr>
-            <a:picLocks noGrp="1" noChangeAspect="1"/>
-          </p:cNvPicPr>
+      <p:sp>
+        <p:nvSpPr>
+          <p:cNvPr id="3" name="Content Placeholder 2">
+            <a:extLst>
+              <a:ext uri="{FF2B5EF4-FFF2-40B4-BE49-F238E27FC236}">
+                <a16:creationId xmlns:a16="http://schemas.microsoft.com/office/drawing/2014/main" id="{54937C49-72E8-4CD7-BDE6-4438CF7C88EF}"/>
+              </a:ext>
+            </a:extLst>
+          </p:cNvPr>
+          <p:cNvSpPr>
+            <a:spLocks noGrp="1"/>
+          </p:cNvSpPr>
           <p:nvPr>
             <p:ph idx="1"/>
           </p:nvPr>
-        </p:nvPicPr>
-        <p:blipFill>
-          <a:blip r:embed="rId2"/>
-          <a:stretch>
-            <a:fillRect/>
-          </a:stretch>
-        </p:blipFill>
-        <p:spPr>
-          <a:xfrm>
-            <a:off x="670090" y="1622352"/>
-            <a:ext cx="5425910" cy="3071126"/>
-          </a:xfrm>
-          <a:prstGeom prst="rect">
-            <a:avLst/>
-          </a:prstGeom>
-        </p:spPr>
-      </p:pic>
-      <p:pic>
-        <p:nvPicPr>
-          <p:cNvPr id="5" name="Picture 4">
-            <a:extLst>
-              <a:ext uri="{FF2B5EF4-FFF2-40B4-BE49-F238E27FC236}">
-                <a16:creationId xmlns:a16="http://schemas.microsoft.com/office/drawing/2014/main" id="{CB8F85B9-9DB8-4958-9828-C0989584148C}"/>
-              </a:ext>
-            </a:extLst>
-          </p:cNvPr>
-          <p:cNvPicPr>
-            <a:picLocks noChangeAspect="1"/>
-          </p:cNvPicPr>
-          <p:nvPr/>
-        </p:nvPicPr>
-        <p:blipFill>
-          <a:blip r:embed="rId3"/>
-          <a:stretch>
-            <a:fillRect/>
-          </a:stretch>
-        </p:blipFill>
-        <p:spPr>
-          <a:xfrm>
-            <a:off x="772969" y="5151639"/>
-            <a:ext cx="5220152" cy="1341236"/>
-          </a:xfrm>
-          <a:prstGeom prst="rect">
-            <a:avLst/>
-          </a:prstGeom>
-        </p:spPr>
-      </p:pic>
+        </p:nvSpPr>
+        <p:spPr/>
+        <p:txBody>
+          <a:bodyPr/>
+          <a:lstStyle/>
+          <a:p>
+            <a:r>
+              <a:rPr lang="en-US" dirty="0"/>
+              <a:t>Classical time series methods: ARIMA, GRACH, stochastic processes</a:t>
+            </a:r>
+          </a:p>
+          <a:p>
+            <a:r>
+              <a:rPr lang="en-US" dirty="0"/>
+              <a:t>ML methods: </a:t>
+            </a:r>
+          </a:p>
+          <a:p>
+            <a:pPr lvl="1"/>
+            <a:r>
+              <a:rPr lang="en-US" dirty="0"/>
+              <a:t>Non-sequential: NN, regression </a:t>
+            </a:r>
+            <a:r>
+              <a:rPr lang="en-US" dirty="0" err="1"/>
+              <a:t>etc</a:t>
+            </a:r>
+            <a:endParaRPr lang="en-US" dirty="0"/>
+          </a:p>
+          <a:p>
+            <a:pPr lvl="1"/>
+            <a:r>
+              <a:rPr lang="en-US" dirty="0"/>
+              <a:t>Sequential: RNN, LSTM </a:t>
+            </a:r>
+            <a:r>
+              <a:rPr lang="en-US" dirty="0" err="1"/>
+              <a:t>etc</a:t>
+            </a:r>
+            <a:endParaRPr lang="ru-KZ" dirty="0"/>
+          </a:p>
+        </p:txBody>
+      </p:sp>
     </p:spTree>
     <p:extLst>
       <p:ext uri="{BB962C8B-B14F-4D97-AF65-F5344CB8AC3E}">
-        <p14:creationId xmlns:p14="http://schemas.microsoft.com/office/powerpoint/2010/main" val="3473840003"/>
+        <p14:creationId xmlns:p14="http://schemas.microsoft.com/office/powerpoint/2010/main" val="1364394069"/>
       </p:ext>
     </p:extLst>
   </p:cSld>

</xml_diff>